<commit_message>
updated pictures for the paper
</commit_message>
<xml_diff>
--- a/Image Crop.pptx
+++ b/Image Crop.pptx
@@ -6,6 +6,7 @@
   </p:sldMasterIdLst>
   <p:sldIdLst>
     <p:sldId id="256" r:id="rId2"/>
+    <p:sldId id="258" r:id="rId3"/>
   </p:sldIdLst>
   <p:sldSz cx="12192000" cy="6858000"/>
   <p:notesSz cx="6858000" cy="9144000"/>
@@ -104,6 +105,11 @@
       </a:defRPr>
     </a:lvl9pPr>
   </p:defaultTextStyle>
+  <p:extLst>
+    <p:ext uri="{EFAFB233-063F-42B5-8137-9DF3F51BA10A}">
+      <p15:sldGuideLst xmlns:p15="http://schemas.microsoft.com/office/powerpoint/2012/main"/>
+    </p:ext>
+  </p:extLst>
 </p:presentation>
 </file>
 
@@ -254,7 +260,7 @@
           <a:p>
             <a:fld id="{D747D464-1B2A-4A32-AE8A-348B0938C9B8}" type="datetimeFigureOut">
               <a:rPr lang="en-US" smtClean="0"/>
-              <a:t>1/7/2022</a:t>
+              <a:t>7/19/22</a:t>
             </a:fld>
             <a:endParaRPr lang="en-US"/>
           </a:p>
@@ -452,7 +458,7 @@
           <a:p>
             <a:fld id="{D747D464-1B2A-4A32-AE8A-348B0938C9B8}" type="datetimeFigureOut">
               <a:rPr lang="en-US" smtClean="0"/>
-              <a:t>1/7/2022</a:t>
+              <a:t>7/19/22</a:t>
             </a:fld>
             <a:endParaRPr lang="en-US"/>
           </a:p>
@@ -660,7 +666,7 @@
           <a:p>
             <a:fld id="{D747D464-1B2A-4A32-AE8A-348B0938C9B8}" type="datetimeFigureOut">
               <a:rPr lang="en-US" smtClean="0"/>
-              <a:t>1/7/2022</a:t>
+              <a:t>7/19/22</a:t>
             </a:fld>
             <a:endParaRPr lang="en-US"/>
           </a:p>
@@ -858,7 +864,7 @@
           <a:p>
             <a:fld id="{D747D464-1B2A-4A32-AE8A-348B0938C9B8}" type="datetimeFigureOut">
               <a:rPr lang="en-US" smtClean="0"/>
-              <a:t>1/7/2022</a:t>
+              <a:t>7/19/22</a:t>
             </a:fld>
             <a:endParaRPr lang="en-US"/>
           </a:p>
@@ -1133,7 +1139,7 @@
           <a:p>
             <a:fld id="{D747D464-1B2A-4A32-AE8A-348B0938C9B8}" type="datetimeFigureOut">
               <a:rPr lang="en-US" smtClean="0"/>
-              <a:t>1/7/2022</a:t>
+              <a:t>7/19/22</a:t>
             </a:fld>
             <a:endParaRPr lang="en-US"/>
           </a:p>
@@ -1398,7 +1404,7 @@
           <a:p>
             <a:fld id="{D747D464-1B2A-4A32-AE8A-348B0938C9B8}" type="datetimeFigureOut">
               <a:rPr lang="en-US" smtClean="0"/>
-              <a:t>1/7/2022</a:t>
+              <a:t>7/19/22</a:t>
             </a:fld>
             <a:endParaRPr lang="en-US"/>
           </a:p>
@@ -1810,7 +1816,7 @@
           <a:p>
             <a:fld id="{D747D464-1B2A-4A32-AE8A-348B0938C9B8}" type="datetimeFigureOut">
               <a:rPr lang="en-US" smtClean="0"/>
-              <a:t>1/7/2022</a:t>
+              <a:t>7/19/22</a:t>
             </a:fld>
             <a:endParaRPr lang="en-US"/>
           </a:p>
@@ -1951,7 +1957,7 @@
           <a:p>
             <a:fld id="{D747D464-1B2A-4A32-AE8A-348B0938C9B8}" type="datetimeFigureOut">
               <a:rPr lang="en-US" smtClean="0"/>
-              <a:t>1/7/2022</a:t>
+              <a:t>7/19/22</a:t>
             </a:fld>
             <a:endParaRPr lang="en-US"/>
           </a:p>
@@ -2064,7 +2070,7 @@
           <a:p>
             <a:fld id="{D747D464-1B2A-4A32-AE8A-348B0938C9B8}" type="datetimeFigureOut">
               <a:rPr lang="en-US" smtClean="0"/>
-              <a:t>1/7/2022</a:t>
+              <a:t>7/19/22</a:t>
             </a:fld>
             <a:endParaRPr lang="en-US"/>
           </a:p>
@@ -2375,7 +2381,7 @@
           <a:p>
             <a:fld id="{D747D464-1B2A-4A32-AE8A-348B0938C9B8}" type="datetimeFigureOut">
               <a:rPr lang="en-US" smtClean="0"/>
-              <a:t>1/7/2022</a:t>
+              <a:t>7/19/22</a:t>
             </a:fld>
             <a:endParaRPr lang="en-US"/>
           </a:p>
@@ -2663,7 +2669,7 @@
           <a:p>
             <a:fld id="{D747D464-1B2A-4A32-AE8A-348B0938C9B8}" type="datetimeFigureOut">
               <a:rPr lang="en-US" smtClean="0"/>
-              <a:t>1/7/2022</a:t>
+              <a:t>7/19/22</a:t>
             </a:fld>
             <a:endParaRPr lang="en-US"/>
           </a:p>
@@ -2904,7 +2910,7 @@
           <a:p>
             <a:fld id="{D747D464-1B2A-4A32-AE8A-348B0938C9B8}" type="datetimeFigureOut">
               <a:rPr lang="en-US" smtClean="0"/>
-              <a:t>1/7/2022</a:t>
+              <a:t>7/19/22</a:t>
             </a:fld>
             <a:endParaRPr lang="en-US"/>
           </a:p>
@@ -3402,6 +3408,76 @@
 </p:sld>
 </file>
 
+<file path=ppt/slides/slide2.xml><?xml version="1.0" encoding="utf-8"?>
+<p:sld xmlns:a="http://schemas.openxmlformats.org/drawingml/2006/main" xmlns:r="http://schemas.openxmlformats.org/officeDocument/2006/relationships" xmlns:p="http://schemas.openxmlformats.org/presentationml/2006/main">
+  <p:cSld>
+    <p:spTree>
+      <p:nvGrpSpPr>
+        <p:cNvPr id="1" name=""/>
+        <p:cNvGrpSpPr/>
+        <p:nvPr/>
+      </p:nvGrpSpPr>
+      <p:grpSpPr>
+        <a:xfrm>
+          <a:off x="0" y="0"/>
+          <a:ext cx="0" cy="0"/>
+          <a:chOff x="0" y="0"/>
+          <a:chExt cx="0" cy="0"/>
+        </a:xfrm>
+      </p:grpSpPr>
+      <p:pic>
+        <p:nvPicPr>
+          <p:cNvPr id="14" name="Picture 13" descr="A picture containing person, outdoor&#10;&#10;Description automatically generated">
+            <a:extLst>
+              <a:ext uri="{FF2B5EF4-FFF2-40B4-BE49-F238E27FC236}">
+                <a16:creationId xmlns:a16="http://schemas.microsoft.com/office/drawing/2014/main" id="{41B622FF-3477-F548-834F-3C7414DA314F}"/>
+              </a:ext>
+            </a:extLst>
+          </p:cNvPr>
+          <p:cNvPicPr>
+            <a:picLocks noChangeAspect="1"/>
+          </p:cNvPicPr>
+          <p:nvPr/>
+        </p:nvPicPr>
+        <p:blipFill rotWithShape="1">
+          <a:blip r:embed="rId2">
+            <a:extLst>
+              <a:ext uri="{28A0092B-C50C-407E-A947-70E740481C1C}">
+                <a14:useLocalDpi xmlns:a14="http://schemas.microsoft.com/office/drawing/2010/main" val="0"/>
+              </a:ext>
+            </a:extLst>
+          </a:blip>
+          <a:srcRect l="-22806" t="1633" r="-21447" b="826"/>
+          <a:stretch/>
+        </p:blipFill>
+        <p:spPr>
+          <a:xfrm>
+            <a:off x="3247505" y="2068757"/>
+            <a:ext cx="2743200" cy="2743200"/>
+          </a:xfrm>
+          <a:prstGeom prst="rect">
+            <a:avLst/>
+          </a:prstGeom>
+          <a:ln w="28575">
+            <a:solidFill>
+              <a:schemeClr val="tx1"/>
+            </a:solidFill>
+          </a:ln>
+        </p:spPr>
+      </p:pic>
+    </p:spTree>
+    <p:extLst>
+      <p:ext uri="{BB962C8B-B14F-4D97-AF65-F5344CB8AC3E}">
+        <p14:creationId xmlns:p14="http://schemas.microsoft.com/office/powerpoint/2010/main" val="1262460482"/>
+      </p:ext>
+    </p:extLst>
+  </p:cSld>
+  <p:clrMapOvr>
+    <a:masterClrMapping/>
+  </p:clrMapOvr>
+</p:sld>
+</file>
+
 <file path=ppt/theme/theme1.xml><?xml version="1.0" encoding="utf-8"?>
 <a:theme xmlns:a="http://schemas.openxmlformats.org/drawingml/2006/main" name="Office Theme">
   <a:themeElements>

</xml_diff>

<commit_message>
update papers and CV
</commit_message>
<xml_diff>
--- a/Image Crop.pptx
+++ b/Image Crop.pptx
@@ -7,6 +7,7 @@
   <p:sldIdLst>
     <p:sldId id="256" r:id="rId2"/>
     <p:sldId id="258" r:id="rId3"/>
+    <p:sldId id="259" r:id="rId4"/>
   </p:sldIdLst>
   <p:sldSz cx="12192000" cy="6858000"/>
   <p:notesSz cx="6858000" cy="9144000"/>
@@ -260,7 +261,7 @@
           <a:p>
             <a:fld id="{D747D464-1B2A-4A32-AE8A-348B0938C9B8}" type="datetimeFigureOut">
               <a:rPr lang="en-US" smtClean="0"/>
-              <a:t>7/19/22</a:t>
+              <a:t>11/15/22</a:t>
             </a:fld>
             <a:endParaRPr lang="en-US"/>
           </a:p>
@@ -458,7 +459,7 @@
           <a:p>
             <a:fld id="{D747D464-1B2A-4A32-AE8A-348B0938C9B8}" type="datetimeFigureOut">
               <a:rPr lang="en-US" smtClean="0"/>
-              <a:t>7/19/22</a:t>
+              <a:t>11/15/22</a:t>
             </a:fld>
             <a:endParaRPr lang="en-US"/>
           </a:p>
@@ -666,7 +667,7 @@
           <a:p>
             <a:fld id="{D747D464-1B2A-4A32-AE8A-348B0938C9B8}" type="datetimeFigureOut">
               <a:rPr lang="en-US" smtClean="0"/>
-              <a:t>7/19/22</a:t>
+              <a:t>11/15/22</a:t>
             </a:fld>
             <a:endParaRPr lang="en-US"/>
           </a:p>
@@ -864,7 +865,7 @@
           <a:p>
             <a:fld id="{D747D464-1B2A-4A32-AE8A-348B0938C9B8}" type="datetimeFigureOut">
               <a:rPr lang="en-US" smtClean="0"/>
-              <a:t>7/19/22</a:t>
+              <a:t>11/15/22</a:t>
             </a:fld>
             <a:endParaRPr lang="en-US"/>
           </a:p>
@@ -1139,7 +1140,7 @@
           <a:p>
             <a:fld id="{D747D464-1B2A-4A32-AE8A-348B0938C9B8}" type="datetimeFigureOut">
               <a:rPr lang="en-US" smtClean="0"/>
-              <a:t>7/19/22</a:t>
+              <a:t>11/15/22</a:t>
             </a:fld>
             <a:endParaRPr lang="en-US"/>
           </a:p>
@@ -1404,7 +1405,7 @@
           <a:p>
             <a:fld id="{D747D464-1B2A-4A32-AE8A-348B0938C9B8}" type="datetimeFigureOut">
               <a:rPr lang="en-US" smtClean="0"/>
-              <a:t>7/19/22</a:t>
+              <a:t>11/15/22</a:t>
             </a:fld>
             <a:endParaRPr lang="en-US"/>
           </a:p>
@@ -1816,7 +1817,7 @@
           <a:p>
             <a:fld id="{D747D464-1B2A-4A32-AE8A-348B0938C9B8}" type="datetimeFigureOut">
               <a:rPr lang="en-US" smtClean="0"/>
-              <a:t>7/19/22</a:t>
+              <a:t>11/15/22</a:t>
             </a:fld>
             <a:endParaRPr lang="en-US"/>
           </a:p>
@@ -1957,7 +1958,7 @@
           <a:p>
             <a:fld id="{D747D464-1B2A-4A32-AE8A-348B0938C9B8}" type="datetimeFigureOut">
               <a:rPr lang="en-US" smtClean="0"/>
-              <a:t>7/19/22</a:t>
+              <a:t>11/15/22</a:t>
             </a:fld>
             <a:endParaRPr lang="en-US"/>
           </a:p>
@@ -2070,7 +2071,7 @@
           <a:p>
             <a:fld id="{D747D464-1B2A-4A32-AE8A-348B0938C9B8}" type="datetimeFigureOut">
               <a:rPr lang="en-US" smtClean="0"/>
-              <a:t>7/19/22</a:t>
+              <a:t>11/15/22</a:t>
             </a:fld>
             <a:endParaRPr lang="en-US"/>
           </a:p>
@@ -2381,7 +2382,7 @@
           <a:p>
             <a:fld id="{D747D464-1B2A-4A32-AE8A-348B0938C9B8}" type="datetimeFigureOut">
               <a:rPr lang="en-US" smtClean="0"/>
-              <a:t>7/19/22</a:t>
+              <a:t>11/15/22</a:t>
             </a:fld>
             <a:endParaRPr lang="en-US"/>
           </a:p>
@@ -2669,7 +2670,7 @@
           <a:p>
             <a:fld id="{D747D464-1B2A-4A32-AE8A-348B0938C9B8}" type="datetimeFigureOut">
               <a:rPr lang="en-US" smtClean="0"/>
-              <a:t>7/19/22</a:t>
+              <a:t>11/15/22</a:t>
             </a:fld>
             <a:endParaRPr lang="en-US"/>
           </a:p>
@@ -2910,7 +2911,7 @@
           <a:p>
             <a:fld id="{D747D464-1B2A-4A32-AE8A-348B0938C9B8}" type="datetimeFigureOut">
               <a:rPr lang="en-US" smtClean="0"/>
-              <a:t>7/19/22</a:t>
+              <a:t>11/15/22</a:t>
             </a:fld>
             <a:endParaRPr lang="en-US"/>
           </a:p>
@@ -3478,6 +3479,116 @@
 </p:sld>
 </file>
 
+<file path=ppt/slides/slide3.xml><?xml version="1.0" encoding="utf-8"?>
+<p:sld xmlns:a="http://schemas.openxmlformats.org/drawingml/2006/main" xmlns:r="http://schemas.openxmlformats.org/officeDocument/2006/relationships" xmlns:p="http://schemas.openxmlformats.org/presentationml/2006/main">
+  <p:cSld>
+    <p:spTree>
+      <p:nvGrpSpPr>
+        <p:cNvPr id="1" name=""/>
+        <p:cNvGrpSpPr/>
+        <p:nvPr/>
+      </p:nvGrpSpPr>
+      <p:grpSpPr>
+        <a:xfrm>
+          <a:off x="0" y="0"/>
+          <a:ext cx="0" cy="0"/>
+          <a:chOff x="0" y="0"/>
+          <a:chExt cx="0" cy="0"/>
+        </a:xfrm>
+      </p:grpSpPr>
+      <p:pic>
+        <p:nvPicPr>
+          <p:cNvPr id="14" name="Picture 13" descr="A picture containing person, outdoor&#10;&#10;Description automatically generated">
+            <a:extLst>
+              <a:ext uri="{FF2B5EF4-FFF2-40B4-BE49-F238E27FC236}">
+                <a16:creationId xmlns:a16="http://schemas.microsoft.com/office/drawing/2014/main" id="{41B622FF-3477-F548-834F-3C7414DA314F}"/>
+              </a:ext>
+            </a:extLst>
+          </p:cNvPr>
+          <p:cNvPicPr>
+            <a:picLocks noChangeAspect="1"/>
+          </p:cNvPicPr>
+          <p:nvPr/>
+        </p:nvPicPr>
+        <p:blipFill rotWithShape="1">
+          <a:blip r:embed="rId2">
+            <a:extLst>
+              <a:ext uri="{28A0092B-C50C-407E-A947-70E740481C1C}">
+                <a14:useLocalDpi xmlns:a14="http://schemas.microsoft.com/office/drawing/2010/main" val="0"/>
+              </a:ext>
+            </a:extLst>
+          </a:blip>
+          <a:srcRect l="-22806" t="1633" r="-21447" b="826"/>
+          <a:stretch/>
+        </p:blipFill>
+        <p:spPr>
+          <a:xfrm>
+            <a:off x="3247505" y="2068757"/>
+            <a:ext cx="2743200" cy="2743200"/>
+          </a:xfrm>
+          <a:prstGeom prst="rect">
+            <a:avLst/>
+          </a:prstGeom>
+          <a:ln w="28575">
+            <a:solidFill>
+              <a:schemeClr val="tx1"/>
+            </a:solidFill>
+          </a:ln>
+        </p:spPr>
+      </p:pic>
+      <p:pic>
+        <p:nvPicPr>
+          <p:cNvPr id="5" name="Picture 4">
+            <a:extLst>
+              <a:ext uri="{FF2B5EF4-FFF2-40B4-BE49-F238E27FC236}">
+                <a16:creationId xmlns:a16="http://schemas.microsoft.com/office/drawing/2014/main" id="{F20DAEF4-6ABD-E942-A08A-2329D27D70F7}"/>
+              </a:ext>
+            </a:extLst>
+          </p:cNvPr>
+          <p:cNvPicPr>
+            <a:picLocks noChangeAspect="1"/>
+          </p:cNvPicPr>
+          <p:nvPr/>
+        </p:nvPicPr>
+        <p:blipFill rotWithShape="1">
+          <a:blip r:embed="rId3">
+            <a:extLst>
+              <a:ext uri="{28A0092B-C50C-407E-A947-70E740481C1C}">
+                <a14:useLocalDpi xmlns:a14="http://schemas.microsoft.com/office/drawing/2010/main" val="0"/>
+              </a:ext>
+            </a:extLst>
+          </a:blip>
+          <a:srcRect l="2541" r="2541"/>
+          <a:stretch/>
+        </p:blipFill>
+        <p:spPr>
+          <a:xfrm>
+            <a:off x="7095387" y="2057400"/>
+            <a:ext cx="2743200" cy="2743200"/>
+          </a:xfrm>
+          <a:prstGeom prst="rect">
+            <a:avLst/>
+          </a:prstGeom>
+          <a:ln w="28575">
+            <a:solidFill>
+              <a:schemeClr val="tx1"/>
+            </a:solidFill>
+          </a:ln>
+        </p:spPr>
+      </p:pic>
+    </p:spTree>
+    <p:extLst>
+      <p:ext uri="{BB962C8B-B14F-4D97-AF65-F5344CB8AC3E}">
+        <p14:creationId xmlns:p14="http://schemas.microsoft.com/office/powerpoint/2010/main" val="862402031"/>
+      </p:ext>
+    </p:extLst>
+  </p:cSld>
+  <p:clrMapOvr>
+    <a:masterClrMapping/>
+  </p:clrMapOvr>
+</p:sld>
+</file>
+
 <file path=ppt/theme/theme1.xml><?xml version="1.0" encoding="utf-8"?>
 <a:theme xmlns:a="http://schemas.openxmlformats.org/drawingml/2006/main" name="Office Theme">
   <a:themeElements>

</xml_diff>